<commit_message>
Changed the title slide of the presentation
</commit_message>
<xml_diff>
--- a/AI/Project3/Findings Presentation.pptx
+++ b/AI/Project3/Findings Presentation.pptx
@@ -5390,8 +5390,13 @@
           <a:p>
             <a:r>
               <a:rPr lang="en-US" dirty="0"/>
-              <a:t>Project 3: TensorFlow Model</a:t>
-            </a:r>
+              <a:t>Project </a:t>
+            </a:r>
+            <a:r>
+              <a:rPr lang="en-US"/>
+              <a:t>3 Presentation</a:t>
+            </a:r>
+            <a:endParaRPr lang="en-US" dirty="0"/>
           </a:p>
         </p:txBody>
       </p:sp>

</xml_diff>

<commit_message>
Updated PowerPoint, changed some test spots and comments
</commit_message>
<xml_diff>
--- a/AI/Project3/Findings Presentation.pptx
+++ b/AI/Project3/Findings Presentation.pptx
@@ -28,6 +28,10 @@
     <p:sldId id="273" r:id="rId22"/>
     <p:sldId id="276" r:id="rId23"/>
     <p:sldId id="277" r:id="rId24"/>
+    <p:sldId id="279" r:id="rId25"/>
+    <p:sldId id="281" r:id="rId26"/>
+    <p:sldId id="282" r:id="rId27"/>
+    <p:sldId id="280" r:id="rId28"/>
   </p:sldIdLst>
   <p:sldSz cx="12192000" cy="6858000"/>
   <p:notesSz cx="6858000" cy="9144000"/>
@@ -229,7 +233,7 @@
           <a:effectLst/>
           <a:extLst>
             <a:ext uri="{91240B29-F687-4f45-9708-019B960494DF}">
-              <a14:hiddenLine xmlns="" xmlns:a14="http://schemas.microsoft.com/office/drawing/2010/main" w="9525">
+              <a14:hiddenLine xmlns:a14="http://schemas.microsoft.com/office/drawing/2010/main" xmlns="" w="9525">
                 <a:solidFill>
                   <a:srgbClr val="000000"/>
                 </a:solidFill>
@@ -422,7 +426,7 @@
             <a:fld id="{08B9EBBA-996F-894A-B54A-D6246ED52CEA}" type="datetimeFigureOut">
               <a:rPr lang="en-US" dirty="0"/>
               <a:pPr/>
-              <a:t>4/26/20</a:t>
+              <a:t>5/6/20</a:t>
             </a:fld>
             <a:endParaRPr lang="en-US" dirty="0"/>
           </a:p>
@@ -737,7 +741,7 @@
             <a:fld id="{18C79C5D-2A6F-F04D-97DA-BEF2467B64E4}" type="datetimeFigureOut">
               <a:rPr lang="en-US" dirty="0"/>
               <a:pPr/>
-              <a:t>4/26/20</a:t>
+              <a:t>5/6/20</a:t>
             </a:fld>
             <a:endParaRPr lang="en-US" dirty="0"/>
           </a:p>
@@ -1222,7 +1226,7 @@
             <a:fld id="{8DFA1846-DA80-1C48-A609-854EA85C59AD}" type="datetimeFigureOut">
               <a:rPr lang="en-US" dirty="0"/>
               <a:pPr/>
-              <a:t>4/26/20</a:t>
+              <a:t>5/6/20</a:t>
             </a:fld>
             <a:endParaRPr lang="en-US" dirty="0"/>
           </a:p>
@@ -1588,7 +1592,7 @@
             <a:fld id="{FBF54567-0DE4-3F47-BF90-CB84690072F9}" type="datetimeFigureOut">
               <a:rPr lang="en-US" dirty="0"/>
               <a:pPr/>
-              <a:t>4/26/20</a:t>
+              <a:t>5/6/20</a:t>
             </a:fld>
             <a:endParaRPr lang="en-US" dirty="0"/>
           </a:p>
@@ -1739,7 +1743,7 @@
           <a:ln/>
           <a:extLst>
             <a:ext uri="{91240B29-F687-4f45-9708-019B960494DF}">
-              <a14:hiddenLine xmlns="" xmlns:a14="http://schemas.microsoft.com/office/drawing/2010/main" w="9525">
+              <a14:hiddenLine xmlns:a14="http://schemas.microsoft.com/office/drawing/2010/main" xmlns="" w="9525">
                 <a:solidFill>
                   <a:srgbClr val="000000"/>
                 </a:solidFill>
@@ -1858,7 +1862,7 @@
             <a:fld id="{C6C52C72-DE31-F449-A4ED-4C594FD91407}" type="datetimeFigureOut">
               <a:rPr lang="en-US" dirty="0"/>
               <a:pPr/>
-              <a:t>4/26/20</a:t>
+              <a:t>5/6/20</a:t>
             </a:fld>
             <a:endParaRPr lang="en-US" dirty="0"/>
           </a:p>
@@ -2011,7 +2015,7 @@
           <a:ln/>
           <a:extLst>
             <a:ext uri="{91240B29-F687-4f45-9708-019B960494DF}">
-              <a14:hiddenLine xmlns="" xmlns:a14="http://schemas.microsoft.com/office/drawing/2010/main" w="9525">
+              <a14:hiddenLine xmlns:a14="http://schemas.microsoft.com/office/drawing/2010/main" xmlns="" w="9525">
                 <a:solidFill>
                   <a:srgbClr val="000000"/>
                 </a:solidFill>
@@ -2140,7 +2144,7 @@
             <a:fld id="{ED62726E-379B-B349-9EED-81ED093FA806}" type="datetimeFigureOut">
               <a:rPr lang="en-US" dirty="0"/>
               <a:pPr/>
-              <a:t>4/26/20</a:t>
+              <a:t>5/6/20</a:t>
             </a:fld>
             <a:endParaRPr lang="en-US" dirty="0"/>
           </a:p>
@@ -2291,7 +2295,7 @@
           <a:ln/>
           <a:extLst>
             <a:ext uri="{91240B29-F687-4f45-9708-019B960494DF}">
-              <a14:hiddenLine xmlns="" xmlns:a14="http://schemas.microsoft.com/office/drawing/2010/main" w="9525">
+              <a14:hiddenLine xmlns:a14="http://schemas.microsoft.com/office/drawing/2010/main" xmlns="" w="9525">
                 <a:solidFill>
                   <a:srgbClr val="000000"/>
                 </a:solidFill>
@@ -2420,7 +2424,7 @@
             <a:fld id="{9B3A1323-8D79-1946-B0D7-40001CF92E9D}" type="datetimeFigureOut">
               <a:rPr lang="en-US" dirty="0"/>
               <a:pPr/>
-              <a:t>4/26/20</a:t>
+              <a:t>5/6/20</a:t>
             </a:fld>
             <a:endParaRPr lang="en-US" dirty="0"/>
           </a:p>
@@ -2760,7 +2764,7 @@
             <a:fld id="{8DFA1846-DA80-1C48-A609-854EA85C59AD}" type="datetimeFigureOut">
               <a:rPr lang="en-US" dirty="0"/>
               <a:pPr/>
-              <a:t>4/26/20</a:t>
+              <a:t>5/6/20</a:t>
             </a:fld>
             <a:endParaRPr lang="en-US" dirty="0"/>
           </a:p>
@@ -2911,7 +2915,7 @@
           <a:ln/>
           <a:extLst>
             <a:ext uri="{91240B29-F687-4f45-9708-019B960494DF}">
-              <a14:hiddenLine xmlns="" xmlns:a14="http://schemas.microsoft.com/office/drawing/2010/main" w="9525">
+              <a14:hiddenLine xmlns:a14="http://schemas.microsoft.com/office/drawing/2010/main" xmlns="" w="9525">
                 <a:solidFill>
                   <a:srgbClr val="000000"/>
                 </a:solidFill>
@@ -3096,7 +3100,7 @@
             <a:fld id="{57302355-E14B-8545-A8F8-0FE83CC9D524}" type="datetimeFigureOut">
               <a:rPr lang="en-US" dirty="0"/>
               <a:pPr/>
-              <a:t>4/26/20</a:t>
+              <a:t>5/6/20</a:t>
             </a:fld>
             <a:endParaRPr lang="en-US" dirty="0"/>
           </a:p>
@@ -3247,7 +3251,7 @@
           <a:ln/>
           <a:extLst>
             <a:ext uri="{91240B29-F687-4f45-9708-019B960494DF}">
-              <a14:hiddenLine xmlns="" xmlns:a14="http://schemas.microsoft.com/office/drawing/2010/main" w="9525">
+              <a14:hiddenLine xmlns:a14="http://schemas.microsoft.com/office/drawing/2010/main" xmlns="" w="9525">
                 <a:solidFill>
                   <a:srgbClr val="000000"/>
                 </a:solidFill>
@@ -3570,7 +3574,7 @@
             <a:fld id="{02640F58-564D-2B4F-AE67-E407BA4FCF45}" type="datetimeFigureOut">
               <a:rPr lang="en-US" dirty="0"/>
               <a:pPr/>
-              <a:t>4/26/20</a:t>
+              <a:t>5/6/20</a:t>
             </a:fld>
             <a:endParaRPr lang="en-US" dirty="0"/>
           </a:p>
@@ -3721,7 +3725,7 @@
           <a:ln/>
           <a:extLst>
             <a:ext uri="{91240B29-F687-4f45-9708-019B960494DF}">
-              <a14:hiddenLine xmlns="" xmlns:a14="http://schemas.microsoft.com/office/drawing/2010/main" w="9525">
+              <a14:hiddenLine xmlns:a14="http://schemas.microsoft.com/office/drawing/2010/main" xmlns="" w="9525">
                 <a:solidFill>
                   <a:srgbClr val="000000"/>
                 </a:solidFill>
@@ -3788,7 +3792,7 @@
             <a:fld id="{F13A34C8-038E-2045-AF43-DF7DBB8E0E9E}" type="datetimeFigureOut">
               <a:rPr lang="en-US" dirty="0"/>
               <a:pPr/>
-              <a:t>4/26/20</a:t>
+              <a:t>5/6/20</a:t>
             </a:fld>
             <a:endParaRPr lang="en-US" dirty="0"/>
           </a:p>
@@ -3880,7 +3884,7 @@
             <a:fld id="{8818C68F-D26B-8F47-958C-23B49CF8A634}" type="datetimeFigureOut">
               <a:rPr lang="en-US" dirty="0"/>
               <a:pPr/>
-              <a:t>4/26/20</a:t>
+              <a:t>5/6/20</a:t>
             </a:fld>
             <a:endParaRPr lang="en-US" dirty="0"/>
           </a:p>
@@ -4144,7 +4148,7 @@
           <a:ln/>
           <a:extLst>
             <a:ext uri="{91240B29-F687-4f45-9708-019B960494DF}">
-              <a14:hiddenLine xmlns="" xmlns:a14="http://schemas.microsoft.com/office/drawing/2010/main" w="9525">
+              <a14:hiddenLine xmlns:a14="http://schemas.microsoft.com/office/drawing/2010/main" xmlns="" w="9525">
                 <a:solidFill>
                   <a:srgbClr val="000000"/>
                 </a:solidFill>
@@ -4344,7 +4348,7 @@
             <a:fld id="{D0DF5E60-9974-AC48-9591-99C2BB44B7CF}" type="datetimeFigureOut">
               <a:rPr lang="en-US" dirty="0"/>
               <a:pPr/>
-              <a:t>4/26/20</a:t>
+              <a:t>5/6/20</a:t>
             </a:fld>
             <a:endParaRPr lang="en-US" dirty="0"/>
           </a:p>
@@ -4654,7 +4658,7 @@
             <a:fld id="{18C79C5D-2A6F-F04D-97DA-BEF2467B64E4}" type="datetimeFigureOut">
               <a:rPr lang="en-US" dirty="0"/>
               <a:pPr/>
-              <a:t>4/26/20</a:t>
+              <a:t>5/6/20</a:t>
             </a:fld>
             <a:endParaRPr lang="en-US" dirty="0"/>
           </a:p>
@@ -4921,7 +4925,7 @@
             <a:fld id="{09B482E8-6E0E-1B4F-B1FD-C69DB9E858D9}" type="datetimeFigureOut">
               <a:rPr lang="en-US" dirty="0"/>
               <a:pPr/>
-              <a:t>4/26/20</a:t>
+              <a:t>5/6/20</a:t>
             </a:fld>
             <a:endParaRPr lang="en-US" dirty="0"/>
           </a:p>
@@ -7828,6 +7832,759 @@
 </p:sld>
 </file>
 
+<file path=ppt/slides/slide24.xml><?xml version="1.0" encoding="utf-8"?>
+<p:sld xmlns:a="http://schemas.openxmlformats.org/drawingml/2006/main" xmlns:r="http://schemas.openxmlformats.org/officeDocument/2006/relationships" xmlns:p="http://schemas.openxmlformats.org/presentationml/2006/main">
+  <p:cSld>
+    <p:spTree>
+      <p:nvGrpSpPr>
+        <p:cNvPr id="1" name=""/>
+        <p:cNvGrpSpPr/>
+        <p:nvPr/>
+      </p:nvGrpSpPr>
+      <p:grpSpPr>
+        <a:xfrm>
+          <a:off x="0" y="0"/>
+          <a:ext cx="0" cy="0"/>
+          <a:chOff x="0" y="0"/>
+          <a:chExt cx="0" cy="0"/>
+        </a:xfrm>
+      </p:grpSpPr>
+      <p:sp>
+        <p:nvSpPr>
+          <p:cNvPr id="2" name="Title 1">
+            <a:extLst>
+              <a:ext uri="{FF2B5EF4-FFF2-40B4-BE49-F238E27FC236}">
+                <a16:creationId xmlns:a16="http://schemas.microsoft.com/office/drawing/2014/main" id="{BB296786-E715-1D4D-9B1C-7EC1FBDC94C0}"/>
+              </a:ext>
+            </a:extLst>
+          </p:cNvPr>
+          <p:cNvSpPr>
+            <a:spLocks noGrp="1"/>
+          </p:cNvSpPr>
+          <p:nvPr>
+            <p:ph type="title"/>
+          </p:nvPr>
+        </p:nvSpPr>
+        <p:spPr/>
+        <p:txBody>
+          <a:bodyPr/>
+          <a:lstStyle/>
+          <a:p>
+            <a:r>
+              <a:rPr lang="en-US" dirty="0"/>
+              <a:t>Additional Changes Made</a:t>
+            </a:r>
+          </a:p>
+        </p:txBody>
+      </p:sp>
+      <p:sp>
+        <p:nvSpPr>
+          <p:cNvPr id="3" name="Content Placeholder 2">
+            <a:extLst>
+              <a:ext uri="{FF2B5EF4-FFF2-40B4-BE49-F238E27FC236}">
+                <a16:creationId xmlns:a16="http://schemas.microsoft.com/office/drawing/2014/main" id="{660660DE-65C7-394F-8AA6-B0300A6C4CCB}"/>
+              </a:ext>
+            </a:extLst>
+          </p:cNvPr>
+          <p:cNvSpPr>
+            <a:spLocks noGrp="1"/>
+          </p:cNvSpPr>
+          <p:nvPr>
+            <p:ph idx="1"/>
+          </p:nvPr>
+        </p:nvSpPr>
+        <p:spPr/>
+        <p:txBody>
+          <a:bodyPr/>
+          <a:lstStyle/>
+          <a:p>
+            <a:r>
+              <a:rPr lang="en-US" dirty="0"/>
+              <a:t>After displaying my network and findings to the class and watching other people’s presentations, I came to 2 conclusions:</a:t>
+            </a:r>
+          </a:p>
+          <a:p>
+            <a:pPr lvl="1"/>
+            <a:r>
+              <a:rPr lang="en-US" dirty="0"/>
+              <a:t>I should make my own model</a:t>
+            </a:r>
+          </a:p>
+          <a:p>
+            <a:pPr lvl="1"/>
+            <a:r>
+              <a:rPr lang="en-US" dirty="0"/>
+              <a:t>I should use the Adam optimizer</a:t>
+            </a:r>
+          </a:p>
+        </p:txBody>
+      </p:sp>
+    </p:spTree>
+    <p:extLst>
+      <p:ext uri="{BB962C8B-B14F-4D97-AF65-F5344CB8AC3E}">
+        <p14:creationId xmlns:p14="http://schemas.microsoft.com/office/powerpoint/2010/main" val="109723595"/>
+      </p:ext>
+    </p:extLst>
+  </p:cSld>
+  <p:clrMapOvr>
+    <a:masterClrMapping/>
+  </p:clrMapOvr>
+</p:sld>
+</file>
+
+<file path=ppt/slides/slide25.xml><?xml version="1.0" encoding="utf-8"?>
+<p:sld xmlns:a="http://schemas.openxmlformats.org/drawingml/2006/main" xmlns:r="http://schemas.openxmlformats.org/officeDocument/2006/relationships" xmlns:p="http://schemas.openxmlformats.org/presentationml/2006/main">
+  <p:cSld>
+    <p:spTree>
+      <p:nvGrpSpPr>
+        <p:cNvPr id="1" name=""/>
+        <p:cNvGrpSpPr/>
+        <p:nvPr/>
+      </p:nvGrpSpPr>
+      <p:grpSpPr>
+        <a:xfrm>
+          <a:off x="0" y="0"/>
+          <a:ext cx="0" cy="0"/>
+          <a:chOff x="0" y="0"/>
+          <a:chExt cx="0" cy="0"/>
+        </a:xfrm>
+      </p:grpSpPr>
+      <p:sp>
+        <p:nvSpPr>
+          <p:cNvPr id="2" name="Title 1">
+            <a:extLst>
+              <a:ext uri="{FF2B5EF4-FFF2-40B4-BE49-F238E27FC236}">
+                <a16:creationId xmlns:a16="http://schemas.microsoft.com/office/drawing/2014/main" id="{A64693CD-7CDB-B14E-A24C-F42F7942B565}"/>
+              </a:ext>
+            </a:extLst>
+          </p:cNvPr>
+          <p:cNvSpPr>
+            <a:spLocks noGrp="1"/>
+          </p:cNvSpPr>
+          <p:nvPr>
+            <p:ph type="title"/>
+          </p:nvPr>
+        </p:nvSpPr>
+        <p:spPr/>
+        <p:txBody>
+          <a:bodyPr/>
+          <a:lstStyle/>
+          <a:p>
+            <a:r>
+              <a:rPr lang="en-US" dirty="0"/>
+              <a:t>My Model</a:t>
+            </a:r>
+          </a:p>
+        </p:txBody>
+      </p:sp>
+      <p:sp>
+        <p:nvSpPr>
+          <p:cNvPr id="3" name="Content Placeholder 2">
+            <a:extLst>
+              <a:ext uri="{FF2B5EF4-FFF2-40B4-BE49-F238E27FC236}">
+                <a16:creationId xmlns:a16="http://schemas.microsoft.com/office/drawing/2014/main" id="{E7A6B1F6-E003-A346-94F0-93D3CC1CBF33}"/>
+              </a:ext>
+            </a:extLst>
+          </p:cNvPr>
+          <p:cNvSpPr>
+            <a:spLocks noGrp="1"/>
+          </p:cNvSpPr>
+          <p:nvPr>
+            <p:ph idx="1"/>
+          </p:nvPr>
+        </p:nvSpPr>
+        <p:spPr>
+          <a:xfrm>
+            <a:off x="818712" y="2222287"/>
+            <a:ext cx="10554574" cy="3230660"/>
+          </a:xfrm>
+        </p:spPr>
+        <p:txBody>
+          <a:bodyPr>
+            <a:normAutofit/>
+          </a:bodyPr>
+          <a:lstStyle/>
+          <a:p>
+            <a:r>
+              <a:rPr lang="en-US" dirty="0"/>
+              <a:t>Very similar to the </a:t>
+            </a:r>
+            <a:r>
+              <a:rPr lang="en-US" dirty="0" err="1"/>
+              <a:t>Keras</a:t>
+            </a:r>
+            <a:r>
+              <a:rPr lang="en-US" dirty="0"/>
+              <a:t> example, but with 2 key differences:</a:t>
+            </a:r>
+          </a:p>
+          <a:p>
+            <a:pPr lvl="1"/>
+            <a:r>
+              <a:rPr lang="en-US" dirty="0"/>
+              <a:t>After every layer, the batch is normalized</a:t>
+            </a:r>
+          </a:p>
+          <a:p>
+            <a:pPr marL="457200" lvl="1" indent="0">
+              <a:buNone/>
+            </a:pPr>
+            <a:endParaRPr lang="en-US" dirty="0"/>
+          </a:p>
+          <a:p>
+            <a:pPr marL="457200" lvl="1" indent="0">
+              <a:buNone/>
+            </a:pPr>
+            <a:endParaRPr lang="en-US" dirty="0"/>
+          </a:p>
+          <a:p>
+            <a:pPr lvl="1"/>
+            <a:r>
+              <a:rPr lang="en-US" dirty="0"/>
+              <a:t>Rather than using the RMS prop optimizer, I used the Adam optimizer</a:t>
+            </a:r>
+          </a:p>
+        </p:txBody>
+      </p:sp>
+      <p:pic>
+        <p:nvPicPr>
+          <p:cNvPr id="5" name="Picture 4">
+            <a:extLst>
+              <a:ext uri="{FF2B5EF4-FFF2-40B4-BE49-F238E27FC236}">
+                <a16:creationId xmlns:a16="http://schemas.microsoft.com/office/drawing/2014/main" id="{B0FE93A0-990A-F443-B0E2-CCD49890A64D}"/>
+              </a:ext>
+            </a:extLst>
+          </p:cNvPr>
+          <p:cNvPicPr>
+            <a:picLocks noChangeAspect="1"/>
+          </p:cNvPicPr>
+          <p:nvPr/>
+        </p:nvPicPr>
+        <p:blipFill>
+          <a:blip r:embed="rId2"/>
+          <a:stretch>
+            <a:fillRect/>
+          </a:stretch>
+        </p:blipFill>
+        <p:spPr>
+          <a:xfrm>
+            <a:off x="7058722" y="3801945"/>
+            <a:ext cx="5041860" cy="504186"/>
+          </a:xfrm>
+          <a:prstGeom prst="rect">
+            <a:avLst/>
+          </a:prstGeom>
+        </p:spPr>
+      </p:pic>
+      <p:cxnSp>
+        <p:nvCxnSpPr>
+          <p:cNvPr id="7" name="Straight Arrow Connector 6">
+            <a:extLst>
+              <a:ext uri="{FF2B5EF4-FFF2-40B4-BE49-F238E27FC236}">
+                <a16:creationId xmlns:a16="http://schemas.microsoft.com/office/drawing/2014/main" id="{30A4D4C2-B6FC-A041-A55E-5CA2C5F7AF30}"/>
+              </a:ext>
+            </a:extLst>
+          </p:cNvPr>
+          <p:cNvCxnSpPr>
+            <a:cxnSpLocks/>
+          </p:cNvCxnSpPr>
+          <p:nvPr/>
+        </p:nvCxnSpPr>
+        <p:spPr>
+          <a:xfrm>
+            <a:off x="5776332" y="3501483"/>
+            <a:ext cx="1193180" cy="552555"/>
+          </a:xfrm>
+          <a:prstGeom prst="straightConnector1">
+            <a:avLst/>
+          </a:prstGeom>
+          <a:ln>
+            <a:tailEnd type="triangle"/>
+          </a:ln>
+        </p:spPr>
+        <p:style>
+          <a:lnRef idx="1">
+            <a:schemeClr val="accent2"/>
+          </a:lnRef>
+          <a:fillRef idx="0">
+            <a:schemeClr val="accent2"/>
+          </a:fillRef>
+          <a:effectRef idx="0">
+            <a:schemeClr val="accent2"/>
+          </a:effectRef>
+          <a:fontRef idx="minor">
+            <a:schemeClr val="tx1"/>
+          </a:fontRef>
+        </p:style>
+      </p:cxnSp>
+      <p:pic>
+        <p:nvPicPr>
+          <p:cNvPr id="11" name="Picture 10">
+            <a:extLst>
+              <a:ext uri="{FF2B5EF4-FFF2-40B4-BE49-F238E27FC236}">
+                <a16:creationId xmlns:a16="http://schemas.microsoft.com/office/drawing/2014/main" id="{0E3C4EDB-33BD-6844-84F6-4116CEEE7E01}"/>
+              </a:ext>
+            </a:extLst>
+          </p:cNvPr>
+          <p:cNvPicPr>
+            <a:picLocks noChangeAspect="1"/>
+          </p:cNvPicPr>
+          <p:nvPr/>
+        </p:nvPicPr>
+        <p:blipFill>
+          <a:blip r:embed="rId3"/>
+          <a:stretch>
+            <a:fillRect/>
+          </a:stretch>
+        </p:blipFill>
+        <p:spPr>
+          <a:xfrm>
+            <a:off x="2677532" y="5790645"/>
+            <a:ext cx="6197600" cy="647700"/>
+          </a:xfrm>
+          <a:prstGeom prst="rect">
+            <a:avLst/>
+          </a:prstGeom>
+        </p:spPr>
+      </p:pic>
+      <p:cxnSp>
+        <p:nvCxnSpPr>
+          <p:cNvPr id="13" name="Straight Arrow Connector 12">
+            <a:extLst>
+              <a:ext uri="{FF2B5EF4-FFF2-40B4-BE49-F238E27FC236}">
+                <a16:creationId xmlns:a16="http://schemas.microsoft.com/office/drawing/2014/main" id="{840482F9-03EA-2647-AF38-52E26CEF2F41}"/>
+              </a:ext>
+            </a:extLst>
+          </p:cNvPr>
+          <p:cNvCxnSpPr>
+            <a:cxnSpLocks/>
+          </p:cNvCxnSpPr>
+          <p:nvPr/>
+        </p:nvCxnSpPr>
+        <p:spPr>
+          <a:xfrm>
+            <a:off x="5776332" y="5174166"/>
+            <a:ext cx="0" cy="481832"/>
+          </a:xfrm>
+          <a:prstGeom prst="straightConnector1">
+            <a:avLst/>
+          </a:prstGeom>
+          <a:ln>
+            <a:tailEnd type="triangle"/>
+          </a:ln>
+        </p:spPr>
+        <p:style>
+          <a:lnRef idx="1">
+            <a:schemeClr val="accent2"/>
+          </a:lnRef>
+          <a:fillRef idx="0">
+            <a:schemeClr val="accent2"/>
+          </a:fillRef>
+          <a:effectRef idx="0">
+            <a:schemeClr val="accent2"/>
+          </a:effectRef>
+          <a:fontRef idx="minor">
+            <a:schemeClr val="tx1"/>
+          </a:fontRef>
+        </p:style>
+      </p:cxnSp>
+      <p:cxnSp>
+        <p:nvCxnSpPr>
+          <p:cNvPr id="18" name="Straight Connector 17">
+            <a:extLst>
+              <a:ext uri="{FF2B5EF4-FFF2-40B4-BE49-F238E27FC236}">
+                <a16:creationId xmlns:a16="http://schemas.microsoft.com/office/drawing/2014/main" id="{17CF3EB9-49D3-A849-83A7-882E4CE8A507}"/>
+              </a:ext>
+            </a:extLst>
+          </p:cNvPr>
+          <p:cNvCxnSpPr/>
+          <p:nvPr/>
+        </p:nvCxnSpPr>
+        <p:spPr>
+          <a:xfrm>
+            <a:off x="8486078" y="4594302"/>
+            <a:ext cx="468351" cy="0"/>
+          </a:xfrm>
+          <a:prstGeom prst="line">
+            <a:avLst/>
+          </a:prstGeom>
+        </p:spPr>
+        <p:style>
+          <a:lnRef idx="1">
+            <a:schemeClr val="accent2"/>
+          </a:lnRef>
+          <a:fillRef idx="0">
+            <a:schemeClr val="accent2"/>
+          </a:fillRef>
+          <a:effectRef idx="0">
+            <a:schemeClr val="accent2"/>
+          </a:effectRef>
+          <a:fontRef idx="minor">
+            <a:schemeClr val="tx1"/>
+          </a:fontRef>
+        </p:style>
+      </p:cxnSp>
+      <p:cxnSp>
+        <p:nvCxnSpPr>
+          <p:cNvPr id="20" name="Straight Connector 19">
+            <a:extLst>
+              <a:ext uri="{FF2B5EF4-FFF2-40B4-BE49-F238E27FC236}">
+                <a16:creationId xmlns:a16="http://schemas.microsoft.com/office/drawing/2014/main" id="{C3A49D2A-6B7E-BB4F-BE60-5D9AC9DA9311}"/>
+              </a:ext>
+            </a:extLst>
+          </p:cNvPr>
+          <p:cNvCxnSpPr>
+            <a:cxnSpLocks/>
+          </p:cNvCxnSpPr>
+          <p:nvPr/>
+        </p:nvCxnSpPr>
+        <p:spPr>
+          <a:xfrm>
+            <a:off x="8965580" y="4594302"/>
+            <a:ext cx="0" cy="579864"/>
+          </a:xfrm>
+          <a:prstGeom prst="line">
+            <a:avLst/>
+          </a:prstGeom>
+        </p:spPr>
+        <p:style>
+          <a:lnRef idx="1">
+            <a:schemeClr val="accent2"/>
+          </a:lnRef>
+          <a:fillRef idx="0">
+            <a:schemeClr val="accent2"/>
+          </a:fillRef>
+          <a:effectRef idx="0">
+            <a:schemeClr val="accent2"/>
+          </a:effectRef>
+          <a:fontRef idx="minor">
+            <a:schemeClr val="tx1"/>
+          </a:fontRef>
+        </p:style>
+      </p:cxnSp>
+      <p:cxnSp>
+        <p:nvCxnSpPr>
+          <p:cNvPr id="22" name="Straight Connector 21">
+            <a:extLst>
+              <a:ext uri="{FF2B5EF4-FFF2-40B4-BE49-F238E27FC236}">
+                <a16:creationId xmlns:a16="http://schemas.microsoft.com/office/drawing/2014/main" id="{164B6B75-4D3F-224C-9358-BE9A89758265}"/>
+              </a:ext>
+            </a:extLst>
+          </p:cNvPr>
+          <p:cNvCxnSpPr/>
+          <p:nvPr/>
+        </p:nvCxnSpPr>
+        <p:spPr>
+          <a:xfrm>
+            <a:off x="5776332" y="5174166"/>
+            <a:ext cx="3178097" cy="0"/>
+          </a:xfrm>
+          <a:prstGeom prst="line">
+            <a:avLst/>
+          </a:prstGeom>
+        </p:spPr>
+        <p:style>
+          <a:lnRef idx="1">
+            <a:schemeClr val="accent2"/>
+          </a:lnRef>
+          <a:fillRef idx="0">
+            <a:schemeClr val="accent2"/>
+          </a:fillRef>
+          <a:effectRef idx="0">
+            <a:schemeClr val="accent2"/>
+          </a:effectRef>
+          <a:fontRef idx="minor">
+            <a:schemeClr val="tx1"/>
+          </a:fontRef>
+        </p:style>
+      </p:cxnSp>
+    </p:spTree>
+    <p:extLst>
+      <p:ext uri="{BB962C8B-B14F-4D97-AF65-F5344CB8AC3E}">
+        <p14:creationId xmlns:p14="http://schemas.microsoft.com/office/powerpoint/2010/main" val="1149840664"/>
+      </p:ext>
+    </p:extLst>
+  </p:cSld>
+  <p:clrMapOvr>
+    <a:masterClrMapping/>
+  </p:clrMapOvr>
+</p:sld>
+</file>
+
+<file path=ppt/slides/slide26.xml><?xml version="1.0" encoding="utf-8"?>
+<p:sld xmlns:a="http://schemas.openxmlformats.org/drawingml/2006/main" xmlns:r="http://schemas.openxmlformats.org/officeDocument/2006/relationships" xmlns:p="http://schemas.openxmlformats.org/presentationml/2006/main">
+  <p:cSld>
+    <p:spTree>
+      <p:nvGrpSpPr>
+        <p:cNvPr id="1" name=""/>
+        <p:cNvGrpSpPr/>
+        <p:nvPr/>
+      </p:nvGrpSpPr>
+      <p:grpSpPr>
+        <a:xfrm>
+          <a:off x="0" y="0"/>
+          <a:ext cx="0" cy="0"/>
+          <a:chOff x="0" y="0"/>
+          <a:chExt cx="0" cy="0"/>
+        </a:xfrm>
+      </p:grpSpPr>
+      <p:sp>
+        <p:nvSpPr>
+          <p:cNvPr id="2" name="Title 1">
+            <a:extLst>
+              <a:ext uri="{FF2B5EF4-FFF2-40B4-BE49-F238E27FC236}">
+                <a16:creationId xmlns:a16="http://schemas.microsoft.com/office/drawing/2014/main" id="{E8872DEC-0A95-6544-99E7-1A518378B45F}"/>
+              </a:ext>
+            </a:extLst>
+          </p:cNvPr>
+          <p:cNvSpPr>
+            <a:spLocks noGrp="1"/>
+          </p:cNvSpPr>
+          <p:nvPr>
+            <p:ph type="title"/>
+          </p:nvPr>
+        </p:nvSpPr>
+        <p:spPr/>
+        <p:txBody>
+          <a:bodyPr/>
+          <a:lstStyle/>
+          <a:p>
+            <a:r>
+              <a:rPr lang="en-US" dirty="0"/>
+              <a:t>Tests</a:t>
+            </a:r>
+          </a:p>
+        </p:txBody>
+      </p:sp>
+      <p:sp>
+        <p:nvSpPr>
+          <p:cNvPr id="3" name="Content Placeholder 2">
+            <a:extLst>
+              <a:ext uri="{FF2B5EF4-FFF2-40B4-BE49-F238E27FC236}">
+                <a16:creationId xmlns:a16="http://schemas.microsoft.com/office/drawing/2014/main" id="{25BF6492-D3F5-8A4E-98F9-1F2CC4A45EF6}"/>
+              </a:ext>
+            </a:extLst>
+          </p:cNvPr>
+          <p:cNvSpPr>
+            <a:spLocks noGrp="1"/>
+          </p:cNvSpPr>
+          <p:nvPr>
+            <p:ph idx="1"/>
+          </p:nvPr>
+        </p:nvSpPr>
+        <p:spPr/>
+        <p:txBody>
+          <a:bodyPr/>
+          <a:lstStyle/>
+          <a:p>
+            <a:r>
+              <a:rPr lang="en-US" dirty="0"/>
+              <a:t>I ran several more tests and tweaked my model accordingly</a:t>
+            </a:r>
+          </a:p>
+          <a:p>
+            <a:r>
+              <a:rPr lang="en-US" dirty="0"/>
+              <a:t>My best test was one with the following conditions:</a:t>
+            </a:r>
+          </a:p>
+          <a:p>
+            <a:pPr lvl="1"/>
+            <a:r>
+              <a:rPr lang="en-US" dirty="0"/>
+              <a:t>150 Epochs</a:t>
+            </a:r>
+          </a:p>
+          <a:p>
+            <a:pPr lvl="1"/>
+            <a:r>
+              <a:rPr lang="en-US" dirty="0"/>
+              <a:t>Using Data Augmentation</a:t>
+            </a:r>
+          </a:p>
+          <a:p>
+            <a:pPr lvl="1"/>
+            <a:r>
+              <a:rPr lang="en-US" dirty="0"/>
+              <a:t>Batch Size of 128</a:t>
+            </a:r>
+          </a:p>
+          <a:p>
+            <a:r>
+              <a:rPr lang="en-US" dirty="0"/>
+              <a:t>I compared it with the same variables on the </a:t>
+            </a:r>
+            <a:r>
+              <a:rPr lang="en-US" dirty="0" err="1"/>
+              <a:t>Keras</a:t>
+            </a:r>
+            <a:r>
+              <a:rPr lang="en-US" dirty="0"/>
+              <a:t> example</a:t>
+            </a:r>
+          </a:p>
+        </p:txBody>
+      </p:sp>
+    </p:spTree>
+    <p:extLst>
+      <p:ext uri="{BB962C8B-B14F-4D97-AF65-F5344CB8AC3E}">
+        <p14:creationId xmlns:p14="http://schemas.microsoft.com/office/powerpoint/2010/main" val="1700011444"/>
+      </p:ext>
+    </p:extLst>
+  </p:cSld>
+  <p:clrMapOvr>
+    <a:masterClrMapping/>
+  </p:clrMapOvr>
+</p:sld>
+</file>
+
+<file path=ppt/slides/slide27.xml><?xml version="1.0" encoding="utf-8"?>
+<p:sld xmlns:a="http://schemas.openxmlformats.org/drawingml/2006/main" xmlns:r="http://schemas.openxmlformats.org/officeDocument/2006/relationships" xmlns:p="http://schemas.openxmlformats.org/presentationml/2006/main">
+  <p:cSld>
+    <p:spTree>
+      <p:nvGrpSpPr>
+        <p:cNvPr id="1" name=""/>
+        <p:cNvGrpSpPr/>
+        <p:nvPr/>
+      </p:nvGrpSpPr>
+      <p:grpSpPr>
+        <a:xfrm>
+          <a:off x="0" y="0"/>
+          <a:ext cx="0" cy="0"/>
+          <a:chOff x="0" y="0"/>
+          <a:chExt cx="0" cy="0"/>
+        </a:xfrm>
+      </p:grpSpPr>
+      <p:sp>
+        <p:nvSpPr>
+          <p:cNvPr id="2" name="Title 1">
+            <a:extLst>
+              <a:ext uri="{FF2B5EF4-FFF2-40B4-BE49-F238E27FC236}">
+                <a16:creationId xmlns:a16="http://schemas.microsoft.com/office/drawing/2014/main" id="{574747E7-2012-A948-A22D-4F24CA302390}"/>
+              </a:ext>
+            </a:extLst>
+          </p:cNvPr>
+          <p:cNvSpPr>
+            <a:spLocks noGrp="1"/>
+          </p:cNvSpPr>
+          <p:nvPr>
+            <p:ph type="title"/>
+          </p:nvPr>
+        </p:nvSpPr>
+        <p:spPr/>
+        <p:txBody>
+          <a:bodyPr/>
+          <a:lstStyle/>
+          <a:p>
+            <a:r>
+              <a:rPr lang="en-US" dirty="0"/>
+              <a:t>Result</a:t>
+            </a:r>
+          </a:p>
+        </p:txBody>
+      </p:sp>
+      <p:pic>
+        <p:nvPicPr>
+          <p:cNvPr id="5" name="Content Placeholder 4" descr="A close up of a map&#10;&#10;Description automatically generated">
+            <a:extLst>
+              <a:ext uri="{FF2B5EF4-FFF2-40B4-BE49-F238E27FC236}">
+                <a16:creationId xmlns:a16="http://schemas.microsoft.com/office/drawing/2014/main" id="{F33E032C-55A0-FA48-89E0-CE45DD927ED2}"/>
+              </a:ext>
+            </a:extLst>
+          </p:cNvPr>
+          <p:cNvPicPr>
+            <a:picLocks noGrp="1" noChangeAspect="1"/>
+          </p:cNvPicPr>
+          <p:nvPr>
+            <p:ph idx="1"/>
+          </p:nvPr>
+        </p:nvPicPr>
+        <p:blipFill>
+          <a:blip r:embed="rId2"/>
+          <a:stretch>
+            <a:fillRect/>
+          </a:stretch>
+        </p:blipFill>
+        <p:spPr>
+          <a:xfrm>
+            <a:off x="809999" y="1930400"/>
+            <a:ext cx="5579649" cy="3719766"/>
+          </a:xfrm>
+        </p:spPr>
+      </p:pic>
+      <p:sp>
+        <p:nvSpPr>
+          <p:cNvPr id="6" name="TextBox 5">
+            <a:extLst>
+              <a:ext uri="{FF2B5EF4-FFF2-40B4-BE49-F238E27FC236}">
+                <a16:creationId xmlns:a16="http://schemas.microsoft.com/office/drawing/2014/main" id="{FCFB9855-0F2D-804E-B5D5-90DA00D80D4F}"/>
+              </a:ext>
+            </a:extLst>
+          </p:cNvPr>
+          <p:cNvSpPr txBox="1"/>
+          <p:nvPr/>
+        </p:nvSpPr>
+        <p:spPr>
+          <a:xfrm>
+            <a:off x="6389648" y="1930400"/>
+            <a:ext cx="4992350" cy="1754326"/>
+          </a:xfrm>
+          <a:prstGeom prst="rect">
+            <a:avLst/>
+          </a:prstGeom>
+          <a:noFill/>
+        </p:spPr>
+        <p:txBody>
+          <a:bodyPr wrap="square" rtlCol="0">
+            <a:spAutoFit/>
+          </a:bodyPr>
+          <a:lstStyle/>
+          <a:p>
+            <a:r>
+              <a:rPr lang="en-US" dirty="0"/>
+              <a:t>Here, the orange is the optimal model and the blue is the normal </a:t>
+            </a:r>
+            <a:r>
+              <a:rPr lang="en-US" dirty="0" err="1"/>
+              <a:t>Keras</a:t>
+            </a:r>
+            <a:r>
+              <a:rPr lang="en-US" dirty="0"/>
+              <a:t> example</a:t>
+            </a:r>
+          </a:p>
+          <a:p>
+            <a:endParaRPr lang="en-US" dirty="0"/>
+          </a:p>
+          <a:p>
+            <a:r>
+              <a:rPr lang="en-US" dirty="0"/>
+              <a:t>My model ended with about 84% accuracy, whereas the </a:t>
+            </a:r>
+            <a:r>
+              <a:rPr lang="en-US" dirty="0" err="1"/>
+              <a:t>Keras</a:t>
+            </a:r>
+            <a:r>
+              <a:rPr lang="en-US" dirty="0"/>
+              <a:t> example got to about 79.5%</a:t>
+            </a:r>
+          </a:p>
+        </p:txBody>
+      </p:sp>
+    </p:spTree>
+    <p:extLst>
+      <p:ext uri="{BB962C8B-B14F-4D97-AF65-F5344CB8AC3E}">
+        <p14:creationId xmlns:p14="http://schemas.microsoft.com/office/powerpoint/2010/main" val="176976054"/>
+      </p:ext>
+    </p:extLst>
+  </p:cSld>
+  <p:clrMapOvr>
+    <a:masterClrMapping/>
+  </p:clrMapOvr>
+</p:sld>
+</file>
+
 <file path=ppt/slides/slide3.xml><?xml version="1.0" encoding="utf-8"?>
 <p:sld xmlns:a="http://schemas.openxmlformats.org/drawingml/2006/main" xmlns:r="http://schemas.openxmlformats.org/officeDocument/2006/relationships" xmlns:p="http://schemas.openxmlformats.org/presentationml/2006/main">
   <p:cSld>
@@ -8612,6 +9369,41 @@
           </a:prstGeom>
         </p:spPr>
       </p:pic>
+      <p:sp>
+        <p:nvSpPr>
+          <p:cNvPr id="4" name="TextBox 3">
+            <a:extLst>
+              <a:ext uri="{FF2B5EF4-FFF2-40B4-BE49-F238E27FC236}">
+                <a16:creationId xmlns:a16="http://schemas.microsoft.com/office/drawing/2014/main" id="{2BE6C40C-A4C9-044A-98F9-5CB45F7A4A5B}"/>
+              </a:ext>
+            </a:extLst>
+          </p:cNvPr>
+          <p:cNvSpPr txBox="1"/>
+          <p:nvPr/>
+        </p:nvSpPr>
+        <p:spPr>
+          <a:xfrm>
+            <a:off x="1894326" y="5492455"/>
+            <a:ext cx="8403347" cy="918357"/>
+          </a:xfrm>
+          <a:prstGeom prst="rect">
+            <a:avLst/>
+          </a:prstGeom>
+          <a:noFill/>
+        </p:spPr>
+        <p:txBody>
+          <a:bodyPr wrap="square" rtlCol="0">
+            <a:spAutoFit/>
+          </a:bodyPr>
+          <a:lstStyle/>
+          <a:p>
+            <a:r>
+              <a:rPr lang="en-US" dirty="0"/>
+              <a:t>Note: There is an error with the comment above. When a neuron hits this layer, it has a 25% chance to dropout. This layer does not mean that exactly 25% of the neurons drop out.</a:t>
+            </a:r>
+          </a:p>
+        </p:txBody>
+      </p:sp>
     </p:spTree>
     <p:extLst>
       <p:ext uri="{BB962C8B-B14F-4D97-AF65-F5344CB8AC3E}">

</xml_diff>